<commit_message>
uploaded the logo source file.
</commit_message>
<xml_diff>
--- a/src/assets/images/degcent_ores_logo.pptx
+++ b/src/assets/images/degcent_ores_logo.pptx
@@ -3095,8 +3095,8 @@
         </p:blipFill>
         <p:spPr>
           <a:xfrm>
-            <a:off x="6143625" y="3792538"/>
-            <a:ext cx="1360170" cy="1264285"/>
+            <a:off x="6777355" y="3291840"/>
+            <a:ext cx="1137920" cy="1057910"/>
           </a:xfrm>
           <a:prstGeom prst="rect">
             <a:avLst/>
@@ -3119,8 +3119,8 @@
         </p:blipFill>
         <p:spPr>
           <a:xfrm>
-            <a:off x="4502150" y="2236788"/>
-            <a:ext cx="2070735" cy="1196975"/>
+            <a:off x="3226435" y="3239135"/>
+            <a:ext cx="2063750" cy="1196975"/>
           </a:xfrm>
           <a:prstGeom prst="rect">
             <a:avLst/>
@@ -3144,7 +3144,7 @@
         </p:blipFill>
         <p:spPr>
           <a:xfrm>
-            <a:off x="6724650" y="2241233"/>
+            <a:off x="5441950" y="1905318"/>
             <a:ext cx="2473325" cy="1188085"/>
           </a:xfrm>
           <a:prstGeom prst="rect">
@@ -3168,7 +3168,7 @@
         </p:blipFill>
         <p:spPr>
           <a:xfrm>
-            <a:off x="2249805" y="2233613"/>
+            <a:off x="3225800" y="1897698"/>
             <a:ext cx="2058035" cy="1203325"/>
           </a:xfrm>
           <a:prstGeom prst="rect">
@@ -3192,8 +3192,8 @@
         </p:blipFill>
         <p:spPr>
           <a:xfrm>
-            <a:off x="3716655" y="3722370"/>
-            <a:ext cx="1458595" cy="1404620"/>
+            <a:off x="5617845" y="3429000"/>
+            <a:ext cx="955675" cy="920750"/>
           </a:xfrm>
           <a:prstGeom prst="rect">
             <a:avLst/>

</xml_diff>